<commit_message>
minor updates after the class
</commit_message>
<xml_diff>
--- a/models-comp-comm/documents/instruction-set-architecture.pptx
+++ b/models-comp-comm/documents/instruction-set-architecture.pptx
@@ -1685,7 +1685,7 @@
         </p:nvSpPr>
         <p:spPr>
           <a:xfrm>
-            <a:off x="381300" y="685800"/>
+            <a:off x="381000" y="685800"/>
             <a:ext cx="6096000" cy="3429000"/>
           </a:xfrm>
           <a:custGeom>
@@ -9576,10 +9576,10 @@
               <a:buNone/>
             </a:pPr>
             <a:r>
-              <a:rPr lang="en"/>
+              <a:rPr lang="en" dirty="0"/>
               <a:t>x86</a:t>
             </a:r>
-            <a:endParaRPr/>
+            <a:endParaRPr dirty="0"/>
           </a:p>
         </p:txBody>
       </p:sp>
@@ -9818,10 +9818,10 @@
               <a:buNone/>
             </a:pPr>
             <a:r>
-              <a:rPr lang="en" sz="1200"/>
+              <a:rPr lang="en" sz="1200" dirty="0"/>
               <a:t>AMD</a:t>
             </a:r>
-            <a:endParaRPr sz="1000"/>
+            <a:endParaRPr sz="1000" dirty="0"/>
           </a:p>
         </p:txBody>
       </p:sp>
@@ -15493,13 +15493,13 @@
               <a:buChar char="○"/>
             </a:pPr>
             <a:r>
-              <a:rPr lang="en" sz="1200" dirty="0" err="1">
+              <a:rPr lang="en" sz="1200">
                 <a:latin typeface="Source Code Pro"/>
                 <a:ea typeface="Source Code Pro"/>
                 <a:cs typeface="Source Code Pro"/>
                 <a:sym typeface="Source Code Pro"/>
               </a:rPr>
-              <a:t>srl</a:t>
+              <a:t>srl  </a:t>
             </a:r>
             <a:r>
               <a:rPr lang="en" sz="1200" dirty="0">
@@ -15508,7 +15508,7 @@
                 <a:cs typeface="Source Code Pro"/>
                 <a:sym typeface="Source Code Pro"/>
               </a:rPr>
-              <a:t>  $a0, $a1, $a2    #  $a0 = $a1 &gt;&gt;&gt; $a2</a:t>
+              <a:t>$a0, $a1, 4     #  $a0 = $a1 &gt;&gt;&gt; 4</a:t>
             </a:r>
             <a:endParaRPr sz="1200" dirty="0">
               <a:latin typeface="Source Code Pro"/>
@@ -15741,13 +15741,13 @@
               <a:buChar char="○"/>
             </a:pPr>
             <a:r>
-              <a:rPr lang="en" sz="1200" dirty="0" err="1">
+              <a:rPr lang="en-US" sz="1200" dirty="0">
                 <a:latin typeface="Source Code Pro"/>
                 <a:ea typeface="Source Code Pro"/>
                 <a:cs typeface="Source Code Pro"/>
                 <a:sym typeface="Source Code Pro"/>
               </a:rPr>
-              <a:t>jal</a:t>
+              <a:t>j</a:t>
             </a:r>
             <a:r>
               <a:rPr lang="en" sz="1200" dirty="0">
@@ -15756,7 +15756,7 @@
                 <a:cs typeface="Source Code Pro"/>
                 <a:sym typeface="Source Code Pro"/>
               </a:rPr>
-              <a:t>	proc       # proc()</a:t>
+              <a:t>al  proc             # method()</a:t>
             </a:r>
             <a:endParaRPr sz="1200" dirty="0">
               <a:latin typeface="Source Code Pro"/>

</xml_diff>